<commit_message>
Add some placeholder slides.
</commit_message>
<xml_diff>
--- a/Why We Must Ask Why of Machine Learning.pptx
+++ b/Why We Must Ask Why of Machine Learning.pptx
@@ -7,6 +7,11 @@
   <p:sldIdLst>
     <p:sldId id="256" r:id="rId2"/>
     <p:sldId id="257" r:id="rId3"/>
+    <p:sldId id="258" r:id="rId4"/>
+    <p:sldId id="259" r:id="rId5"/>
+    <p:sldId id="260" r:id="rId6"/>
+    <p:sldId id="262" r:id="rId7"/>
+    <p:sldId id="261" r:id="rId8"/>
   </p:sldIdLst>
   <p:sldSz cx="12192000" cy="6858000"/>
   <p:notesSz cx="6858000" cy="9144000"/>
@@ -5685,12 +5690,8 @@
           <a:lstStyle/>
           <a:p>
             <a:r>
-              <a:rPr lang="en-US"/>
-              <a:t>Why We </a:t>
-            </a:r>
-            <a:r>
               <a:rPr lang="en-US" dirty="0"/>
-              <a:t>Must Ask Why of Machine Learning</a:t>
+              <a:t>Why We Must Ask Why of Machine Learning</a:t>
             </a:r>
           </a:p>
         </p:txBody>
@@ -5711,14 +5712,21 @@
             <p:ph type="subTitle" idx="1"/>
           </p:nvPr>
         </p:nvSpPr>
-        <p:spPr/>
-        <p:txBody>
-          <a:bodyPr/>
-          <a:lstStyle/>
-          <a:p>
-            <a:r>
-              <a:rPr lang="en-US" dirty="0"/>
-              <a:t>caring about interpretability and explainability of machine learning models</a:t>
+        <p:spPr>
+          <a:xfrm>
+            <a:off x="1371600" y="3632200"/>
+            <a:ext cx="9448800" cy="939799"/>
+          </a:xfrm>
+        </p:spPr>
+        <p:txBody>
+          <a:bodyPr>
+            <a:noAutofit/>
+          </a:bodyPr>
+          <a:lstStyle/>
+          <a:p>
+            <a:r>
+              <a:rPr lang="en-US" sz="3200" dirty="0"/>
+              <a:t>interpretability and explainability of machine learning models and why that matters</a:t>
             </a:r>
           </a:p>
         </p:txBody>
@@ -5774,7 +5782,10 @@
           <a:bodyPr/>
           <a:lstStyle/>
           <a:p>
-            <a:endParaRPr lang="en-US" dirty="0"/>
+            <a:r>
+              <a:rPr lang="en-US" dirty="0"/>
+              <a:t>Introduction</a:t>
+            </a:r>
           </a:p>
         </p:txBody>
       </p:sp>
@@ -5794,19 +5805,727 @@
             <p:ph idx="1"/>
           </p:nvPr>
         </p:nvSpPr>
-        <p:spPr/>
-        <p:txBody>
-          <a:bodyPr/>
-          <a:lstStyle/>
-          <a:p>
-            <a:endParaRPr lang="en-US"/>
-          </a:p>
-        </p:txBody>
-      </p:sp>
+        <p:spPr>
+          <a:xfrm>
+            <a:off x="685800" y="2194561"/>
+            <a:ext cx="10820400" cy="4111236"/>
+          </a:xfrm>
+        </p:spPr>
+        <p:txBody>
+          <a:bodyPr>
+            <a:normAutofit/>
+          </a:bodyPr>
+          <a:lstStyle/>
+          <a:p>
+            <a:r>
+              <a:rPr lang="en-US" sz="3200" dirty="0"/>
+              <a:t>Steve (Stephen) Newman</a:t>
+            </a:r>
+          </a:p>
+          <a:p>
+            <a:r>
+              <a:rPr lang="en-US" sz="3200" dirty="0"/>
+              <a:t>Principal Software Engineer</a:t>
+            </a:r>
+          </a:p>
+          <a:p>
+            <a:r>
+              <a:rPr lang="en-US" sz="3200" dirty="0"/>
+              <a:t>Common Cloud Platform on AVEVA Connect</a:t>
+            </a:r>
+          </a:p>
+          <a:p>
+            <a:pPr marL="0" indent="0">
+              <a:buNone/>
+            </a:pPr>
+            <a:endParaRPr lang="en-US" sz="3200" dirty="0"/>
+          </a:p>
+          <a:p>
+            <a:pPr marL="0" indent="0">
+              <a:buNone/>
+            </a:pPr>
+            <a:r>
+              <a:rPr lang="en-US" sz="3200" dirty="0"/>
+              <a:t>	</a:t>
+            </a:r>
+            <a:r>
+              <a:rPr lang="en-US" sz="3200" dirty="0">
+                <a:hlinkClick r:id="rId2">
+                  <a:extLst>
+                    <a:ext uri="{A12FA001-AC4F-418D-AE19-62706E023703}">
+                      <ahyp:hlinkClr xmlns:ahyp="http://schemas.microsoft.com/office/drawing/2018/hyperlinkcolor" val="tx"/>
+                    </a:ext>
+                  </a:extLst>
+                </a:hlinkClick>
+              </a:rPr>
+              <a:t>/newmancodes</a:t>
+            </a:r>
+            <a:endParaRPr lang="en-US" sz="3200" dirty="0"/>
+          </a:p>
+          <a:p>
+            <a:pPr marL="0" indent="0">
+              <a:buNone/>
+            </a:pPr>
+            <a:r>
+              <a:rPr lang="en-US" sz="3200" dirty="0"/>
+              <a:t>	</a:t>
+            </a:r>
+            <a:r>
+              <a:rPr lang="en-US" sz="3200" dirty="0">
+                <a:hlinkClick r:id="rId3">
+                  <a:extLst>
+                    <a:ext uri="{A12FA001-AC4F-418D-AE19-62706E023703}">
+                      <ahyp:hlinkClr xmlns:ahyp="http://schemas.microsoft.com/office/drawing/2018/hyperlinkcolor" val="tx"/>
+                    </a:ext>
+                  </a:extLst>
+                </a:hlinkClick>
+              </a:rPr>
+              <a:t>/newmancodes</a:t>
+            </a:r>
+            <a:endParaRPr lang="en-US" sz="3200" dirty="0"/>
+          </a:p>
+          <a:p>
+            <a:pPr marL="0" indent="0">
+              <a:buNone/>
+            </a:pPr>
+            <a:r>
+              <a:rPr lang="en-US" sz="3200" dirty="0"/>
+              <a:t>	</a:t>
+            </a:r>
+            <a:r>
+              <a:rPr lang="en-US" sz="3200" dirty="0">
+                <a:hlinkClick r:id="rId4">
+                  <a:extLst>
+                    <a:ext uri="{A12FA001-AC4F-418D-AE19-62706E023703}">
+                      <ahyp:hlinkClr xmlns:ahyp="http://schemas.microsoft.com/office/drawing/2018/hyperlinkcolor" val="tx"/>
+                    </a:ext>
+                  </a:extLst>
+                </a:hlinkClick>
+              </a:rPr>
+              <a:t>newman.digital</a:t>
+            </a:r>
+            <a:endParaRPr lang="en-US" sz="3200" dirty="0"/>
+          </a:p>
+          <a:p>
+            <a:pPr marL="0" indent="0">
+              <a:buNone/>
+            </a:pPr>
+            <a:endParaRPr lang="en-US" sz="2800" dirty="0"/>
+          </a:p>
+        </p:txBody>
+      </p:sp>
+      <p:pic>
+        <p:nvPicPr>
+          <p:cNvPr id="5" name="Graphic 4">
+            <a:extLst>
+              <a:ext uri="{FF2B5EF4-FFF2-40B4-BE49-F238E27FC236}">
+                <a16:creationId xmlns:a16="http://schemas.microsoft.com/office/drawing/2014/main" id="{3228597A-48F0-2287-0207-508C4745F193}"/>
+              </a:ext>
+            </a:extLst>
+          </p:cNvPr>
+          <p:cNvPicPr>
+            <a:picLocks noChangeAspect="1"/>
+          </p:cNvPicPr>
+          <p:nvPr/>
+        </p:nvPicPr>
+        <p:blipFill>
+          <a:blip r:embed="rId5">
+            <a:extLst>
+              <a:ext uri="{96DAC541-7B7A-43D3-8B79-37D633B846F1}">
+                <asvg:svgBlip xmlns:asvg="http://schemas.microsoft.com/office/drawing/2016/SVG/main" r:embed="rId6"/>
+              </a:ext>
+            </a:extLst>
+          </a:blip>
+          <a:stretch>
+            <a:fillRect/>
+          </a:stretch>
+        </p:blipFill>
+        <p:spPr>
+          <a:xfrm>
+            <a:off x="1101899" y="4397046"/>
+            <a:ext cx="523702" cy="523702"/>
+          </a:xfrm>
+          <a:prstGeom prst="rect">
+            <a:avLst/>
+          </a:prstGeom>
+        </p:spPr>
+      </p:pic>
+      <p:pic>
+        <p:nvPicPr>
+          <p:cNvPr id="13" name="Graphic 12">
+            <a:extLst>
+              <a:ext uri="{FF2B5EF4-FFF2-40B4-BE49-F238E27FC236}">
+                <a16:creationId xmlns:a16="http://schemas.microsoft.com/office/drawing/2014/main" id="{E943F8BA-EE38-54C0-508E-0DF1FEA4390C}"/>
+              </a:ext>
+            </a:extLst>
+          </p:cNvPr>
+          <p:cNvPicPr>
+            <a:picLocks noChangeAspect="1"/>
+          </p:cNvPicPr>
+          <p:nvPr/>
+        </p:nvPicPr>
+        <p:blipFill>
+          <a:blip r:embed="rId7">
+            <a:extLst>
+              <a:ext uri="{96DAC541-7B7A-43D3-8B79-37D633B846F1}">
+                <asvg:svgBlip xmlns:asvg="http://schemas.microsoft.com/office/drawing/2016/SVG/main" r:embed="rId8"/>
+              </a:ext>
+            </a:extLst>
+          </a:blip>
+          <a:stretch>
+            <a:fillRect/>
+          </a:stretch>
+        </p:blipFill>
+        <p:spPr>
+          <a:xfrm>
+            <a:off x="1073399" y="4976876"/>
+            <a:ext cx="552203" cy="552203"/>
+          </a:xfrm>
+          <a:prstGeom prst="rect">
+            <a:avLst/>
+          </a:prstGeom>
+        </p:spPr>
+      </p:pic>
+      <p:pic>
+        <p:nvPicPr>
+          <p:cNvPr id="15" name="Graphic 14">
+            <a:extLst>
+              <a:ext uri="{FF2B5EF4-FFF2-40B4-BE49-F238E27FC236}">
+                <a16:creationId xmlns:a16="http://schemas.microsoft.com/office/drawing/2014/main" id="{82578EC4-C745-2E0E-4322-E491ACD714CE}"/>
+              </a:ext>
+            </a:extLst>
+          </p:cNvPr>
+          <p:cNvPicPr>
+            <a:picLocks noChangeAspect="1"/>
+          </p:cNvPicPr>
+          <p:nvPr/>
+        </p:nvPicPr>
+        <p:blipFill>
+          <a:blip r:embed="rId9">
+            <a:extLst>
+              <a:ext uri="{96DAC541-7B7A-43D3-8B79-37D633B846F1}">
+                <asvg:svgBlip xmlns:asvg="http://schemas.microsoft.com/office/drawing/2016/SVG/main" r:embed="rId10"/>
+              </a:ext>
+            </a:extLst>
+          </a:blip>
+          <a:stretch>
+            <a:fillRect/>
+          </a:stretch>
+        </p:blipFill>
+        <p:spPr>
+          <a:xfrm>
+            <a:off x="1073398" y="5641336"/>
+            <a:ext cx="552203" cy="552203"/>
+          </a:xfrm>
+          <a:prstGeom prst="rect">
+            <a:avLst/>
+          </a:prstGeom>
+        </p:spPr>
+      </p:pic>
     </p:spTree>
     <p:extLst>
       <p:ext uri="{BB962C8B-B14F-4D97-AF65-F5344CB8AC3E}">
         <p14:creationId xmlns:p14="http://schemas.microsoft.com/office/powerpoint/2010/main" val="953610781"/>
+      </p:ext>
+    </p:extLst>
+  </p:cSld>
+  <p:clrMapOvr>
+    <a:masterClrMapping/>
+  </p:clrMapOvr>
+</p:sld>
+</file>
+
+<file path=ppt/slides/slide3.xml><?xml version="1.0" encoding="utf-8"?>
+<p:sld xmlns:a="http://schemas.openxmlformats.org/drawingml/2006/main" xmlns:r="http://schemas.openxmlformats.org/officeDocument/2006/relationships" xmlns:p="http://schemas.openxmlformats.org/presentationml/2006/main">
+  <p:cSld>
+    <p:spTree>
+      <p:nvGrpSpPr>
+        <p:cNvPr id="1" name=""/>
+        <p:cNvGrpSpPr/>
+        <p:nvPr/>
+      </p:nvGrpSpPr>
+      <p:grpSpPr>
+        <a:xfrm>
+          <a:off x="0" y="0"/>
+          <a:ext cx="0" cy="0"/>
+          <a:chOff x="0" y="0"/>
+          <a:chExt cx="0" cy="0"/>
+        </a:xfrm>
+      </p:grpSpPr>
+      <p:sp>
+        <p:nvSpPr>
+          <p:cNvPr id="2" name="Title 1">
+            <a:extLst>
+              <a:ext uri="{FF2B5EF4-FFF2-40B4-BE49-F238E27FC236}">
+                <a16:creationId xmlns:a16="http://schemas.microsoft.com/office/drawing/2014/main" id="{247CE6F0-EEA5-7DD8-EBF8-EBE13B983F8C}"/>
+              </a:ext>
+            </a:extLst>
+          </p:cNvPr>
+          <p:cNvSpPr>
+            <a:spLocks noGrp="1"/>
+          </p:cNvSpPr>
+          <p:nvPr>
+            <p:ph type="title"/>
+          </p:nvPr>
+        </p:nvSpPr>
+        <p:spPr/>
+        <p:txBody>
+          <a:bodyPr/>
+          <a:lstStyle/>
+          <a:p>
+            <a:r>
+              <a:rPr lang="en-US" dirty="0"/>
+              <a:t>What is Machine Learning?</a:t>
+            </a:r>
+          </a:p>
+        </p:txBody>
+      </p:sp>
+      <p:sp>
+        <p:nvSpPr>
+          <p:cNvPr id="4" name="Content Placeholder 3">
+            <a:extLst>
+              <a:ext uri="{FF2B5EF4-FFF2-40B4-BE49-F238E27FC236}">
+                <a16:creationId xmlns:a16="http://schemas.microsoft.com/office/drawing/2014/main" id="{F89B2F89-9377-A3FA-6EEF-F26A5B7CAF8F}"/>
+              </a:ext>
+            </a:extLst>
+          </p:cNvPr>
+          <p:cNvSpPr>
+            <a:spLocks noGrp="1"/>
+          </p:cNvSpPr>
+          <p:nvPr>
+            <p:ph sz="half" idx="1"/>
+          </p:nvPr>
+        </p:nvSpPr>
+        <p:spPr/>
+        <p:txBody>
+          <a:bodyPr/>
+          <a:lstStyle/>
+          <a:p>
+            <a:r>
+              <a:rPr lang="en-US" sz="3200" dirty="0"/>
+              <a:t>Sub-field of Artificial Intelligence</a:t>
+            </a:r>
+          </a:p>
+          <a:p>
+            <a:endParaRPr lang="en-US" dirty="0"/>
+          </a:p>
+        </p:txBody>
+      </p:sp>
+      <p:sp>
+        <p:nvSpPr>
+          <p:cNvPr id="5" name="Content Placeholder 4">
+            <a:extLst>
+              <a:ext uri="{FF2B5EF4-FFF2-40B4-BE49-F238E27FC236}">
+                <a16:creationId xmlns:a16="http://schemas.microsoft.com/office/drawing/2014/main" id="{4A7FF353-41D1-AA0D-CE4B-2AC6E44752BD}"/>
+              </a:ext>
+            </a:extLst>
+          </p:cNvPr>
+          <p:cNvSpPr>
+            <a:spLocks noGrp="1"/>
+          </p:cNvSpPr>
+          <p:nvPr>
+            <p:ph sz="half" idx="2"/>
+          </p:nvPr>
+        </p:nvSpPr>
+        <p:spPr/>
+        <p:txBody>
+          <a:bodyPr/>
+          <a:lstStyle/>
+          <a:p>
+            <a:pPr marL="0" indent="0">
+              <a:buNone/>
+            </a:pPr>
+            <a:endParaRPr lang="en-US" dirty="0"/>
+          </a:p>
+        </p:txBody>
+      </p:sp>
+    </p:spTree>
+    <p:extLst>
+      <p:ext uri="{BB962C8B-B14F-4D97-AF65-F5344CB8AC3E}">
+        <p14:creationId xmlns:p14="http://schemas.microsoft.com/office/powerpoint/2010/main" val="2372539012"/>
+      </p:ext>
+    </p:extLst>
+  </p:cSld>
+  <p:clrMapOvr>
+    <a:masterClrMapping/>
+  </p:clrMapOvr>
+</p:sld>
+</file>
+
+<file path=ppt/slides/slide4.xml><?xml version="1.0" encoding="utf-8"?>
+<p:sld xmlns:a="http://schemas.openxmlformats.org/drawingml/2006/main" xmlns:r="http://schemas.openxmlformats.org/officeDocument/2006/relationships" xmlns:p="http://schemas.openxmlformats.org/presentationml/2006/main">
+  <p:cSld>
+    <p:spTree>
+      <p:nvGrpSpPr>
+        <p:cNvPr id="1" name=""/>
+        <p:cNvGrpSpPr/>
+        <p:nvPr/>
+      </p:nvGrpSpPr>
+      <p:grpSpPr>
+        <a:xfrm>
+          <a:off x="0" y="0"/>
+          <a:ext cx="0" cy="0"/>
+          <a:chOff x="0" y="0"/>
+          <a:chExt cx="0" cy="0"/>
+        </a:xfrm>
+      </p:grpSpPr>
+      <p:sp>
+        <p:nvSpPr>
+          <p:cNvPr id="5" name="Title 4">
+            <a:extLst>
+              <a:ext uri="{FF2B5EF4-FFF2-40B4-BE49-F238E27FC236}">
+                <a16:creationId xmlns:a16="http://schemas.microsoft.com/office/drawing/2014/main" id="{1898E551-B940-8936-16F4-9A4C98F75F3C}"/>
+              </a:ext>
+            </a:extLst>
+          </p:cNvPr>
+          <p:cNvSpPr>
+            <a:spLocks noGrp="1"/>
+          </p:cNvSpPr>
+          <p:nvPr>
+            <p:ph type="title"/>
+          </p:nvPr>
+        </p:nvSpPr>
+        <p:spPr/>
+        <p:txBody>
+          <a:bodyPr/>
+          <a:lstStyle/>
+          <a:p>
+            <a:r>
+              <a:rPr lang="en-US" dirty="0"/>
+              <a:t>Models Are Not Perfect</a:t>
+            </a:r>
+          </a:p>
+        </p:txBody>
+      </p:sp>
+      <p:sp>
+        <p:nvSpPr>
+          <p:cNvPr id="6" name="Content Placeholder 5">
+            <a:extLst>
+              <a:ext uri="{FF2B5EF4-FFF2-40B4-BE49-F238E27FC236}">
+                <a16:creationId xmlns:a16="http://schemas.microsoft.com/office/drawing/2014/main" id="{2F73ED38-FBED-FB0E-5992-14BAFDADAC06}"/>
+              </a:ext>
+            </a:extLst>
+          </p:cNvPr>
+          <p:cNvSpPr>
+            <a:spLocks noGrp="1"/>
+          </p:cNvSpPr>
+          <p:nvPr>
+            <p:ph idx="1"/>
+          </p:nvPr>
+        </p:nvSpPr>
+        <p:spPr/>
+        <p:txBody>
+          <a:bodyPr>
+            <a:normAutofit/>
+          </a:bodyPr>
+          <a:lstStyle/>
+          <a:p>
+            <a:endParaRPr lang="en-US" sz="3200" dirty="0"/>
+          </a:p>
+        </p:txBody>
+      </p:sp>
+    </p:spTree>
+    <p:extLst>
+      <p:ext uri="{BB962C8B-B14F-4D97-AF65-F5344CB8AC3E}">
+        <p14:creationId xmlns:p14="http://schemas.microsoft.com/office/powerpoint/2010/main" val="1537847009"/>
+      </p:ext>
+    </p:extLst>
+  </p:cSld>
+  <p:clrMapOvr>
+    <a:masterClrMapping/>
+  </p:clrMapOvr>
+</p:sld>
+</file>
+
+<file path=ppt/slides/slide5.xml><?xml version="1.0" encoding="utf-8"?>
+<p:sld xmlns:a="http://schemas.openxmlformats.org/drawingml/2006/main" xmlns:r="http://schemas.openxmlformats.org/officeDocument/2006/relationships" xmlns:p="http://schemas.openxmlformats.org/presentationml/2006/main">
+  <p:cSld>
+    <p:spTree>
+      <p:nvGrpSpPr>
+        <p:cNvPr id="1" name=""/>
+        <p:cNvGrpSpPr/>
+        <p:nvPr/>
+      </p:nvGrpSpPr>
+      <p:grpSpPr>
+        <a:xfrm>
+          <a:off x="0" y="0"/>
+          <a:ext cx="0" cy="0"/>
+          <a:chOff x="0" y="0"/>
+          <a:chExt cx="0" cy="0"/>
+        </a:xfrm>
+      </p:grpSpPr>
+      <p:sp>
+        <p:nvSpPr>
+          <p:cNvPr id="4" name="Title 3">
+            <a:extLst>
+              <a:ext uri="{FF2B5EF4-FFF2-40B4-BE49-F238E27FC236}">
+                <a16:creationId xmlns:a16="http://schemas.microsoft.com/office/drawing/2014/main" id="{65DD1C17-F621-5BF4-1BF3-126EC100E39A}"/>
+              </a:ext>
+            </a:extLst>
+          </p:cNvPr>
+          <p:cNvSpPr>
+            <a:spLocks noGrp="1"/>
+          </p:cNvSpPr>
+          <p:nvPr>
+            <p:ph type="title"/>
+          </p:nvPr>
+        </p:nvSpPr>
+        <p:spPr/>
+        <p:txBody>
+          <a:bodyPr/>
+          <a:lstStyle/>
+          <a:p>
+            <a:r>
+              <a:rPr lang="en-US" dirty="0"/>
+              <a:t>The Growth of Explainable AI</a:t>
+            </a:r>
+          </a:p>
+        </p:txBody>
+      </p:sp>
+      <p:sp>
+        <p:nvSpPr>
+          <p:cNvPr id="7" name="Content Placeholder 6">
+            <a:extLst>
+              <a:ext uri="{FF2B5EF4-FFF2-40B4-BE49-F238E27FC236}">
+                <a16:creationId xmlns:a16="http://schemas.microsoft.com/office/drawing/2014/main" id="{72C30A44-F315-685B-F96E-32B64F667093}"/>
+              </a:ext>
+            </a:extLst>
+          </p:cNvPr>
+          <p:cNvSpPr>
+            <a:spLocks noGrp="1"/>
+          </p:cNvSpPr>
+          <p:nvPr>
+            <p:ph idx="1"/>
+          </p:nvPr>
+        </p:nvSpPr>
+        <p:spPr/>
+        <p:txBody>
+          <a:bodyPr>
+            <a:normAutofit/>
+          </a:bodyPr>
+          <a:lstStyle/>
+          <a:p>
+            <a:endParaRPr lang="en-US" sz="3200" dirty="0"/>
+          </a:p>
+        </p:txBody>
+      </p:sp>
+    </p:spTree>
+    <p:extLst>
+      <p:ext uri="{BB962C8B-B14F-4D97-AF65-F5344CB8AC3E}">
+        <p14:creationId xmlns:p14="http://schemas.microsoft.com/office/powerpoint/2010/main" val="1243274614"/>
+      </p:ext>
+    </p:extLst>
+  </p:cSld>
+  <p:clrMapOvr>
+    <a:masterClrMapping/>
+  </p:clrMapOvr>
+</p:sld>
+</file>
+
+<file path=ppt/slides/slide6.xml><?xml version="1.0" encoding="utf-8"?>
+<p:sld xmlns:a="http://schemas.openxmlformats.org/drawingml/2006/main" xmlns:r="http://schemas.openxmlformats.org/officeDocument/2006/relationships" xmlns:p="http://schemas.openxmlformats.org/presentationml/2006/main">
+  <p:cSld>
+    <p:spTree>
+      <p:nvGrpSpPr>
+        <p:cNvPr id="1" name=""/>
+        <p:cNvGrpSpPr/>
+        <p:nvPr/>
+      </p:nvGrpSpPr>
+      <p:grpSpPr>
+        <a:xfrm>
+          <a:off x="0" y="0"/>
+          <a:ext cx="0" cy="0"/>
+          <a:chOff x="0" y="0"/>
+          <a:chExt cx="0" cy="0"/>
+        </a:xfrm>
+      </p:grpSpPr>
+      <p:sp>
+        <p:nvSpPr>
+          <p:cNvPr id="2" name="Title 1">
+            <a:extLst>
+              <a:ext uri="{FF2B5EF4-FFF2-40B4-BE49-F238E27FC236}">
+                <a16:creationId xmlns:a16="http://schemas.microsoft.com/office/drawing/2014/main" id="{5F91916B-12BD-C9BC-41CF-9A6EC856E2D9}"/>
+              </a:ext>
+            </a:extLst>
+          </p:cNvPr>
+          <p:cNvSpPr>
+            <a:spLocks noGrp="1"/>
+          </p:cNvSpPr>
+          <p:nvPr>
+            <p:ph type="title"/>
+          </p:nvPr>
+        </p:nvSpPr>
+        <p:spPr/>
+        <p:txBody>
+          <a:bodyPr/>
+          <a:lstStyle/>
+          <a:p>
+            <a:r>
+              <a:rPr lang="en-US" dirty="0"/>
+              <a:t>Beneficiaries of XAI</a:t>
+            </a:r>
+          </a:p>
+        </p:txBody>
+      </p:sp>
+      <p:sp>
+        <p:nvSpPr>
+          <p:cNvPr id="3" name="Content Placeholder 2">
+            <a:extLst>
+              <a:ext uri="{FF2B5EF4-FFF2-40B4-BE49-F238E27FC236}">
+                <a16:creationId xmlns:a16="http://schemas.microsoft.com/office/drawing/2014/main" id="{444743BF-497D-3722-4A84-E4692F8B2AE6}"/>
+              </a:ext>
+            </a:extLst>
+          </p:cNvPr>
+          <p:cNvSpPr>
+            <a:spLocks noGrp="1"/>
+          </p:cNvSpPr>
+          <p:nvPr>
+            <p:ph idx="1"/>
+          </p:nvPr>
+        </p:nvSpPr>
+        <p:spPr/>
+        <p:txBody>
+          <a:bodyPr>
+            <a:normAutofit/>
+          </a:bodyPr>
+          <a:lstStyle/>
+          <a:p>
+            <a:endParaRPr lang="en-US" sz="3200" dirty="0"/>
+          </a:p>
+        </p:txBody>
+      </p:sp>
+    </p:spTree>
+    <p:extLst>
+      <p:ext uri="{BB962C8B-B14F-4D97-AF65-F5344CB8AC3E}">
+        <p14:creationId xmlns:p14="http://schemas.microsoft.com/office/powerpoint/2010/main" val="212891757"/>
+      </p:ext>
+    </p:extLst>
+  </p:cSld>
+  <p:clrMapOvr>
+    <a:masterClrMapping/>
+  </p:clrMapOvr>
+</p:sld>
+</file>
+
+<file path=ppt/slides/slide7.xml><?xml version="1.0" encoding="utf-8"?>
+<p:sld xmlns:a="http://schemas.openxmlformats.org/drawingml/2006/main" xmlns:r="http://schemas.openxmlformats.org/officeDocument/2006/relationships" xmlns:p="http://schemas.openxmlformats.org/presentationml/2006/main">
+  <p:cSld>
+    <p:spTree>
+      <p:nvGrpSpPr>
+        <p:cNvPr id="1" name=""/>
+        <p:cNvGrpSpPr/>
+        <p:nvPr/>
+      </p:nvGrpSpPr>
+      <p:grpSpPr>
+        <a:xfrm>
+          <a:off x="0" y="0"/>
+          <a:ext cx="0" cy="0"/>
+          <a:chOff x="0" y="0"/>
+          <a:chExt cx="0" cy="0"/>
+        </a:xfrm>
+      </p:grpSpPr>
+      <p:sp>
+        <p:nvSpPr>
+          <p:cNvPr id="2" name="Title 1">
+            <a:extLst>
+              <a:ext uri="{FF2B5EF4-FFF2-40B4-BE49-F238E27FC236}">
+                <a16:creationId xmlns:a16="http://schemas.microsoft.com/office/drawing/2014/main" id="{9AEFB33A-1E82-7D43-DA22-C979538ED8F6}"/>
+              </a:ext>
+            </a:extLst>
+          </p:cNvPr>
+          <p:cNvSpPr>
+            <a:spLocks noGrp="1"/>
+          </p:cNvSpPr>
+          <p:nvPr>
+            <p:ph type="title"/>
+          </p:nvPr>
+        </p:nvSpPr>
+        <p:spPr/>
+        <p:txBody>
+          <a:bodyPr/>
+          <a:lstStyle/>
+          <a:p>
+            <a:r>
+              <a:rPr lang="en-US" dirty="0"/>
+              <a:t>XAI </a:t>
+            </a:r>
+            <a:r>
+              <a:rPr lang="en-GB" dirty="0"/>
+              <a:t>Flavours</a:t>
+            </a:r>
+          </a:p>
+        </p:txBody>
+      </p:sp>
+      <p:sp>
+        <p:nvSpPr>
+          <p:cNvPr id="3" name="Content Placeholder 2">
+            <a:extLst>
+              <a:ext uri="{FF2B5EF4-FFF2-40B4-BE49-F238E27FC236}">
+                <a16:creationId xmlns:a16="http://schemas.microsoft.com/office/drawing/2014/main" id="{01845DA4-D9AF-2404-7F7C-3244BE18AB83}"/>
+              </a:ext>
+            </a:extLst>
+          </p:cNvPr>
+          <p:cNvSpPr>
+            <a:spLocks noGrp="1"/>
+          </p:cNvSpPr>
+          <p:nvPr>
+            <p:ph sz="half" idx="1"/>
+          </p:nvPr>
+        </p:nvSpPr>
+        <p:spPr/>
+        <p:txBody>
+          <a:bodyPr>
+            <a:normAutofit/>
+          </a:bodyPr>
+          <a:lstStyle/>
+          <a:p>
+            <a:pPr marL="0" indent="0">
+              <a:buNone/>
+            </a:pPr>
+            <a:r>
+              <a:rPr lang="en-US" sz="3200" dirty="0"/>
+              <a:t>Interpretability</a:t>
+            </a:r>
+          </a:p>
+        </p:txBody>
+      </p:sp>
+      <p:sp>
+        <p:nvSpPr>
+          <p:cNvPr id="4" name="Content Placeholder 3">
+            <a:extLst>
+              <a:ext uri="{FF2B5EF4-FFF2-40B4-BE49-F238E27FC236}">
+                <a16:creationId xmlns:a16="http://schemas.microsoft.com/office/drawing/2014/main" id="{44032628-4806-A002-D922-F3859D9F1F64}"/>
+              </a:ext>
+            </a:extLst>
+          </p:cNvPr>
+          <p:cNvSpPr>
+            <a:spLocks noGrp="1"/>
+          </p:cNvSpPr>
+          <p:nvPr>
+            <p:ph sz="half" idx="2"/>
+          </p:nvPr>
+        </p:nvSpPr>
+        <p:spPr/>
+        <p:txBody>
+          <a:bodyPr>
+            <a:normAutofit/>
+          </a:bodyPr>
+          <a:lstStyle/>
+          <a:p>
+            <a:pPr marL="0" indent="0">
+              <a:buNone/>
+            </a:pPr>
+            <a:r>
+              <a:rPr lang="en-US" sz="3200" dirty="0"/>
+              <a:t>Explainability</a:t>
+            </a:r>
+          </a:p>
+        </p:txBody>
+      </p:sp>
+    </p:spTree>
+    <p:extLst>
+      <p:ext uri="{BB962C8B-B14F-4D97-AF65-F5344CB8AC3E}">
+        <p14:creationId xmlns:p14="http://schemas.microsoft.com/office/powerpoint/2010/main" val="4108920408"/>
       </p:ext>
     </p:extLst>
   </p:cSld>

</xml_diff>

<commit_message>
Add link to github repo containing presentation and notebook.
</commit_message>
<xml_diff>
--- a/Why We Must Ask Why of Machine Learning.pptx
+++ b/Why We Must Ask Why of Machine Learning.pptx
@@ -209,7 +209,7 @@
           <a:p>
             <a:fld id="{43B43CC5-0823-464A-8C91-20023191DC16}" type="datetimeFigureOut">
               <a:rPr lang="en-GB" smtClean="0"/>
-              <a:t>05/04/2023</a:t>
+              <a:t>06/04/2023</a:t>
             </a:fld>
             <a:endParaRPr lang="en-GB"/>
           </a:p>
@@ -2340,7 +2340,7 @@
           <a:p>
             <a:fld id="{48A87A34-81AB-432B-8DAE-1953F412C126}" type="datetimeFigureOut">
               <a:rPr lang="en-US" dirty="0"/>
-              <a:t>4/5/2023</a:t>
+              <a:t>4/6/2023</a:t>
             </a:fld>
             <a:endParaRPr lang="en-US" dirty="0"/>
           </a:p>
@@ -2602,7 +2602,7 @@
           <a:p>
             <a:fld id="{48A87A34-81AB-432B-8DAE-1953F412C126}" type="datetimeFigureOut">
               <a:rPr lang="en-US" dirty="0"/>
-              <a:t>4/5/2023</a:t>
+              <a:t>4/6/2023</a:t>
             </a:fld>
             <a:endParaRPr lang="en-US" dirty="0"/>
           </a:p>
@@ -2829,7 +2829,7 @@
             <a:fld id="{48A87A34-81AB-432B-8DAE-1953F412C126}" type="datetimeFigureOut">
               <a:rPr lang="en-US" dirty="0"/>
               <a:pPr/>
-              <a:t>4/5/2023</a:t>
+              <a:t>4/6/2023</a:t>
             </a:fld>
             <a:endParaRPr lang="en-US" dirty="0"/>
           </a:p>
@@ -3135,7 +3135,7 @@
             <a:fld id="{48A87A34-81AB-432B-8DAE-1953F412C126}" type="datetimeFigureOut">
               <a:rPr lang="en-US" dirty="0"/>
               <a:pPr/>
-              <a:t>4/5/2023</a:t>
+              <a:t>4/6/2023</a:t>
             </a:fld>
             <a:endParaRPr lang="en-US" dirty="0"/>
           </a:p>
@@ -3604,7 +3604,7 @@
             <a:fld id="{48A87A34-81AB-432B-8DAE-1953F412C126}" type="datetimeFigureOut">
               <a:rPr lang="en-US" dirty="0"/>
               <a:pPr/>
-              <a:t>4/5/2023</a:t>
+              <a:t>4/6/2023</a:t>
             </a:fld>
             <a:endParaRPr lang="en-US" dirty="0"/>
           </a:p>
@@ -4146,7 +4146,7 @@
           <a:p>
             <a:fld id="{48A87A34-81AB-432B-8DAE-1953F412C126}" type="datetimeFigureOut">
               <a:rPr lang="en-US" dirty="0"/>
-              <a:t>4/5/2023</a:t>
+              <a:t>4/6/2023</a:t>
             </a:fld>
             <a:endParaRPr lang="en-US" dirty="0"/>
           </a:p>
@@ -4915,7 +4915,7 @@
           <a:p>
             <a:fld id="{48A87A34-81AB-432B-8DAE-1953F412C126}" type="datetimeFigureOut">
               <a:rPr lang="en-US" dirty="0"/>
-              <a:t>4/5/2023</a:t>
+              <a:t>4/6/2023</a:t>
             </a:fld>
             <a:endParaRPr lang="en-US" dirty="0"/>
           </a:p>
@@ -5085,7 +5085,7 @@
           <a:p>
             <a:fld id="{48A87A34-81AB-432B-8DAE-1953F412C126}" type="datetimeFigureOut">
               <a:rPr lang="en-US" dirty="0"/>
-              <a:t>4/5/2023</a:t>
+              <a:t>4/6/2023</a:t>
             </a:fld>
             <a:endParaRPr lang="en-US" dirty="0"/>
           </a:p>
@@ -5304,7 +5304,7 @@
             <a:fld id="{48A87A34-81AB-432B-8DAE-1953F412C126}" type="datetimeFigureOut">
               <a:rPr lang="en-US" dirty="0"/>
               <a:pPr/>
-              <a:t>4/5/2023</a:t>
+              <a:t>4/6/2023</a:t>
             </a:fld>
             <a:endParaRPr lang="en-US" dirty="0"/>
           </a:p>
@@ -5479,7 +5479,7 @@
           <a:p>
             <a:fld id="{48A87A34-81AB-432B-8DAE-1953F412C126}" type="datetimeFigureOut">
               <a:rPr lang="en-US" dirty="0"/>
-              <a:t>4/5/2023</a:t>
+              <a:t>4/6/2023</a:t>
             </a:fld>
             <a:endParaRPr lang="en-US" dirty="0"/>
           </a:p>
@@ -5764,7 +5764,7 @@
             <a:fld id="{48A87A34-81AB-432B-8DAE-1953F412C126}" type="datetimeFigureOut">
               <a:rPr lang="en-US" dirty="0"/>
               <a:pPr/>
-              <a:t>4/5/2023</a:t>
+              <a:t>4/6/2023</a:t>
             </a:fld>
             <a:endParaRPr lang="en-US" dirty="0"/>
           </a:p>
@@ -6001,7 +6001,7 @@
           <a:p>
             <a:fld id="{48A87A34-81AB-432B-8DAE-1953F412C126}" type="datetimeFigureOut">
               <a:rPr lang="en-US" dirty="0"/>
-              <a:t>4/5/2023</a:t>
+              <a:t>4/6/2023</a:t>
             </a:fld>
             <a:endParaRPr lang="en-US" dirty="0"/>
           </a:p>
@@ -6375,7 +6375,7 @@
           <a:p>
             <a:fld id="{48A87A34-81AB-432B-8DAE-1953F412C126}" type="datetimeFigureOut">
               <a:rPr lang="en-US" dirty="0"/>
-              <a:t>4/5/2023</a:t>
+              <a:t>4/6/2023</a:t>
             </a:fld>
             <a:endParaRPr lang="en-US" dirty="0"/>
           </a:p>
@@ -6488,7 +6488,7 @@
           <a:p>
             <a:fld id="{48A87A34-81AB-432B-8DAE-1953F412C126}" type="datetimeFigureOut">
               <a:rPr lang="en-US" dirty="0"/>
-              <a:t>4/5/2023</a:t>
+              <a:t>4/6/2023</a:t>
             </a:fld>
             <a:endParaRPr lang="en-US" dirty="0"/>
           </a:p>
@@ -6578,7 +6578,7 @@
           <a:p>
             <a:fld id="{48A87A34-81AB-432B-8DAE-1953F412C126}" type="datetimeFigureOut">
               <a:rPr lang="en-US" dirty="0"/>
-              <a:t>4/5/2023</a:t>
+              <a:t>4/6/2023</a:t>
             </a:fld>
             <a:endParaRPr lang="en-US" dirty="0"/>
           </a:p>
@@ -6822,7 +6822,7 @@
           <a:p>
             <a:fld id="{48A87A34-81AB-432B-8DAE-1953F412C126}" type="datetimeFigureOut">
               <a:rPr lang="en-US" dirty="0"/>
-              <a:t>4/5/2023</a:t>
+              <a:t>4/6/2023</a:t>
             </a:fld>
             <a:endParaRPr lang="en-US" dirty="0"/>
           </a:p>
@@ -7074,7 +7074,7 @@
           <a:p>
             <a:fld id="{48A87A34-81AB-432B-8DAE-1953F412C126}" type="datetimeFigureOut">
               <a:rPr lang="en-US" dirty="0"/>
-              <a:t>4/5/2023</a:t>
+              <a:t>4/6/2023</a:t>
             </a:fld>
             <a:endParaRPr lang="en-US" dirty="0"/>
           </a:p>
@@ -7313,7 +7313,7 @@
             <a:fld id="{48A87A34-81AB-432B-8DAE-1953F412C126}" type="datetimeFigureOut">
               <a:rPr lang="en-US" dirty="0"/>
               <a:pPr/>
-              <a:t>4/5/2023</a:t>
+              <a:t>4/6/2023</a:t>
             </a:fld>
             <a:endParaRPr lang="en-US" dirty="0"/>
           </a:p>
@@ -9146,7 +9146,76 @@
           <a:p>
             <a:r>
               <a:rPr lang="en-GB" dirty="0"/>
-              <a:t>Questions</a:t>
+              <a:t>Questions?</a:t>
+            </a:r>
+          </a:p>
+        </p:txBody>
+      </p:sp>
+      <p:sp>
+        <p:nvSpPr>
+          <p:cNvPr id="3" name="Content Placeholder 2">
+            <a:extLst>
+              <a:ext uri="{FF2B5EF4-FFF2-40B4-BE49-F238E27FC236}">
+                <a16:creationId xmlns:a16="http://schemas.microsoft.com/office/drawing/2014/main" id="{55F61A85-CDCD-5B55-4533-B01464995627}"/>
+              </a:ext>
+            </a:extLst>
+          </p:cNvPr>
+          <p:cNvSpPr>
+            <a:spLocks noGrp="1"/>
+          </p:cNvSpPr>
+          <p:nvPr>
+            <p:ph idx="1"/>
+          </p:nvPr>
+        </p:nvSpPr>
+        <p:spPr/>
+        <p:txBody>
+          <a:bodyPr>
+            <a:normAutofit/>
+          </a:bodyPr>
+          <a:lstStyle/>
+          <a:p>
+            <a:pPr marL="0" indent="0" algn="r">
+              <a:buNone/>
+            </a:pPr>
+            <a:endParaRPr lang="en-GB" sz="3200" dirty="0"/>
+          </a:p>
+          <a:p>
+            <a:pPr marL="0" indent="0" algn="r">
+              <a:buNone/>
+            </a:pPr>
+            <a:endParaRPr lang="en-GB" sz="3200" dirty="0"/>
+          </a:p>
+          <a:p>
+            <a:pPr marL="0" indent="0" algn="r">
+              <a:buNone/>
+            </a:pPr>
+            <a:endParaRPr lang="en-GB" sz="3200" dirty="0"/>
+          </a:p>
+          <a:p>
+            <a:pPr marL="0" indent="0" algn="r">
+              <a:buNone/>
+            </a:pPr>
+            <a:endParaRPr lang="en-GB" sz="3200" dirty="0"/>
+          </a:p>
+          <a:p>
+            <a:pPr marL="0" indent="0" algn="r">
+              <a:buNone/>
+            </a:pPr>
+            <a:endParaRPr lang="en-GB" sz="3200" dirty="0"/>
+          </a:p>
+          <a:p>
+            <a:pPr marL="0" indent="0" algn="r">
+              <a:buNone/>
+            </a:pPr>
+            <a:endParaRPr lang="en-GB" sz="3200" dirty="0"/>
+          </a:p>
+          <a:p>
+            <a:pPr marL="0" indent="0" algn="r">
+              <a:buNone/>
+            </a:pPr>
+            <a:r>
+              <a:rPr lang="en-GB" sz="3200" u="sng" dirty="0"/>
+              <a:t>https://tinyurl.com/4ef4hmfs</a:t>
             </a:r>
           </a:p>
         </p:txBody>

</xml_diff>

<commit_message>
Add example of when the model gets it wrong.
</commit_message>
<xml_diff>
--- a/Why We Must Ask Why of Machine Learning.pptx
+++ b/Why We Must Ask Why of Machine Learning.pptx
@@ -5,7 +5,7 @@
     <p:sldMasterId id="2147483648" r:id="rId1"/>
   </p:sldMasterIdLst>
   <p:notesMasterIdLst>
-    <p:notesMasterId r:id="rId15"/>
+    <p:notesMasterId r:id="rId16"/>
   </p:notesMasterIdLst>
   <p:sldIdLst>
     <p:sldId id="256" r:id="rId2"/>
@@ -17,10 +17,11 @@
     <p:sldId id="261" r:id="rId8"/>
     <p:sldId id="264" r:id="rId9"/>
     <p:sldId id="265" r:id="rId10"/>
-    <p:sldId id="266" r:id="rId11"/>
-    <p:sldId id="267" r:id="rId12"/>
-    <p:sldId id="263" r:id="rId13"/>
-    <p:sldId id="268" r:id="rId14"/>
+    <p:sldId id="269" r:id="rId11"/>
+    <p:sldId id="266" r:id="rId12"/>
+    <p:sldId id="267" r:id="rId13"/>
+    <p:sldId id="263" r:id="rId14"/>
+    <p:sldId id="268" r:id="rId15"/>
   </p:sldIdLst>
   <p:sldSz cx="12192000" cy="6858000"/>
   <p:notesSz cx="6858000" cy="9144000"/>
@@ -607,25 +608,57 @@
           <a:p>
             <a:r>
               <a:rPr lang="en-GB" dirty="0"/>
-              <a:t>Emerging set of best practices around productionising ML</a:t>
+              <a:t>The MNIST example is sufficiently basic that it may not need much in the way of XAI</a:t>
             </a:r>
           </a:p>
           <a:p>
             <a:r>
               <a:rPr lang="en-GB" dirty="0"/>
-              <a:t>Forms a feedback loop which can trigger to need to train a new model</a:t>
-            </a:r>
+              <a:t>But if the domain we are applying AI is novel, then they may skew us towards wanting to get a view as to how the model is working</a:t>
+            </a:r>
+          </a:p>
+          <a:p>
+            <a:endParaRPr lang="en-GB" dirty="0"/>
           </a:p>
           <a:p>
             <a:r>
               <a:rPr lang="en-GB" dirty="0"/>
-              <a:t>For example, over time a model may cease to be sufficiently generalised as the novel data moves away from the training data</a:t>
+              <a:t>If the domain is higher risk e.g. breast cancer samples being classified as benign or malignant, recommending repair or replacement of valves in an industrial setting</a:t>
             </a:r>
           </a:p>
           <a:p>
             <a:r>
               <a:rPr lang="en-GB" dirty="0"/>
-              <a:t>This should trigger the model be evolved or a new model be developed</a:t>
+              <a:t>If the model is wrong, we may elect to pessimistically classify a mass or the state of a component</a:t>
+            </a:r>
+          </a:p>
+          <a:p>
+            <a:pPr marL="0" marR="0" lvl="0" indent="0" algn="l" defTabSz="914400" rtl="0" eaLnBrk="1" fontAlgn="auto" latinLnBrk="0" hangingPunct="1">
+              <a:lnSpc>
+                <a:spcPct val="100000"/>
+              </a:lnSpc>
+              <a:spcBef>
+                <a:spcPts val="0"/>
+              </a:spcBef>
+              <a:spcAft>
+                <a:spcPts val="0"/>
+              </a:spcAft>
+              <a:buClrTx/>
+              <a:buSzTx/>
+              <a:buFontTx/>
+              <a:buNone/>
+              <a:tabLst/>
+              <a:defRPr/>
+            </a:pPr>
+            <a:r>
+              <a:rPr lang="en-GB" dirty="0"/>
+              <a:t>We would likely be pulled towards supplying an interpretable or explainable model for such high risk domains</a:t>
+            </a:r>
+          </a:p>
+          <a:p>
+            <a:r>
+              <a:rPr lang="en-GB" dirty="0"/>
+              <a:t>But perhaps less so for recommendation engines</a:t>
             </a:r>
           </a:p>
           <a:p>
@@ -634,19 +667,40 @@
           <a:p>
             <a:r>
               <a:rPr lang="en-GB" dirty="0"/>
-              <a:t>Future requests from XAI stakeholders may mean we need to be able to explain a historic model outcome</a:t>
+              <a:t>However, even for scenarios which feel low risk, we cannot necessarily ignore XAI</a:t>
             </a:r>
           </a:p>
           <a:p>
             <a:r>
               <a:rPr lang="en-GB" dirty="0"/>
-              <a:t>Do we capture enough to be able to do that?</a:t>
+              <a:t>For example, if a content platform’s recommendation engine is found to biased this can affect the monetisation potential of a content creator</a:t>
             </a:r>
           </a:p>
           <a:p>
             <a:r>
               <a:rPr lang="en-GB" dirty="0"/>
-              <a:t>Do we record the model outcome and it’s explainer outcomes?</a:t>
+              <a:t>But it’s possible the content consumer is less concerned</a:t>
+            </a:r>
+          </a:p>
+          <a:p>
+            <a:endParaRPr lang="en-GB" dirty="0"/>
+          </a:p>
+          <a:p>
+            <a:r>
+              <a:rPr lang="en-GB" dirty="0"/>
+              <a:t>In the recent Payment Protection Insurance scandal in the UK</a:t>
+            </a:r>
+          </a:p>
+          <a:p>
+            <a:r>
+              <a:rPr lang="en-GB" dirty="0"/>
+              <a:t>Financial institutions had to provide evidence that they had not mis-sold PPI</a:t>
+            </a:r>
+          </a:p>
+          <a:p>
+            <a:r>
+              <a:rPr lang="en-GB" dirty="0"/>
+              <a:t>What if a ML model had taken part in that decision?</a:t>
             </a:r>
           </a:p>
         </p:txBody>
@@ -677,7 +731,7 @@
     </p:spTree>
     <p:extLst>
       <p:ext uri="{BB962C8B-B14F-4D97-AF65-F5344CB8AC3E}">
-        <p14:creationId xmlns:p14="http://schemas.microsoft.com/office/powerpoint/2010/main" val="197462465"/>
+        <p14:creationId xmlns:p14="http://schemas.microsoft.com/office/powerpoint/2010/main" val="1424679041"/>
       </p:ext>
     </p:extLst>
   </p:cSld>
@@ -733,35 +787,47 @@
           <a:p>
             <a:r>
               <a:rPr lang="en-GB" dirty="0"/>
-              <a:t>Be alert to AI not always getting it right</a:t>
+              <a:t>Emerging set of best practices around productionising ML</a:t>
             </a:r>
           </a:p>
           <a:p>
             <a:r>
               <a:rPr lang="en-GB" dirty="0"/>
-              <a:t>Determine what XAI needs your specific scenario has</a:t>
+              <a:t>Forms a feedback loop which can trigger to need to train a new model</a:t>
             </a:r>
           </a:p>
           <a:p>
             <a:r>
               <a:rPr lang="en-GB" dirty="0"/>
-              <a:t>Favour transparent over opaque models if possible</a:t>
+              <a:t>For example, over time a model may cease to be sufficiently generalised as the novel data moves away from the training data</a:t>
             </a:r>
           </a:p>
           <a:p>
             <a:r>
               <a:rPr lang="en-GB" dirty="0"/>
-              <a:t>Remember that your machine learning pipeline may need to produce extra artifacts (e.g. explainers)</a:t>
-            </a:r>
+              <a:t>This should trigger the model be evolved or a new model be developed</a:t>
+            </a:r>
+          </a:p>
+          <a:p>
+            <a:endParaRPr lang="en-GB" dirty="0"/>
           </a:p>
           <a:p>
             <a:r>
               <a:rPr lang="en-GB" dirty="0"/>
-              <a:t>When buying models in, ask the vendor how they have met the explainability challenge</a:t>
-            </a:r>
-          </a:p>
-          <a:p>
-            <a:endParaRPr lang="en-GB" dirty="0"/>
+              <a:t>Future requests from XAI stakeholders may mean we need to be able to explain a historic model outcome</a:t>
+            </a:r>
+          </a:p>
+          <a:p>
+            <a:r>
+              <a:rPr lang="en-GB" dirty="0"/>
+              <a:t>Do we capture enough to be able to do that?</a:t>
+            </a:r>
+          </a:p>
+          <a:p>
+            <a:r>
+              <a:rPr lang="en-GB" dirty="0"/>
+              <a:t>Do we record the model outcome and it’s explainer outcomes?</a:t>
+            </a:r>
           </a:p>
         </p:txBody>
       </p:sp>
@@ -783,6 +849,120 @@
             <a:fld id="{07869F30-5F0B-4D33-8AEC-941C8824577E}" type="slidenum">
               <a:rPr lang="en-GB" smtClean="0"/>
               <a:t>12</a:t>
+            </a:fld>
+            <a:endParaRPr lang="en-GB"/>
+          </a:p>
+        </p:txBody>
+      </p:sp>
+    </p:spTree>
+    <p:extLst>
+      <p:ext uri="{BB962C8B-B14F-4D97-AF65-F5344CB8AC3E}">
+        <p14:creationId xmlns:p14="http://schemas.microsoft.com/office/powerpoint/2010/main" val="197462465"/>
+      </p:ext>
+    </p:extLst>
+  </p:cSld>
+  <p:clrMapOvr>
+    <a:masterClrMapping/>
+  </p:clrMapOvr>
+</p:notes>
+</file>
+
+<file path=ppt/notesSlides/notesSlide12.xml><?xml version="1.0" encoding="utf-8"?>
+<p:notes xmlns:a="http://schemas.openxmlformats.org/drawingml/2006/main" xmlns:r="http://schemas.openxmlformats.org/officeDocument/2006/relationships" xmlns:p="http://schemas.openxmlformats.org/presentationml/2006/main">
+  <p:cSld>
+    <p:spTree>
+      <p:nvGrpSpPr>
+        <p:cNvPr id="1" name=""/>
+        <p:cNvGrpSpPr/>
+        <p:nvPr/>
+      </p:nvGrpSpPr>
+      <p:grpSpPr>
+        <a:xfrm>
+          <a:off x="0" y="0"/>
+          <a:ext cx="0" cy="0"/>
+          <a:chOff x="0" y="0"/>
+          <a:chExt cx="0" cy="0"/>
+        </a:xfrm>
+      </p:grpSpPr>
+      <p:sp>
+        <p:nvSpPr>
+          <p:cNvPr id="2" name="Slide Image Placeholder 1"/>
+          <p:cNvSpPr>
+            <a:spLocks noGrp="1" noRot="1" noChangeAspect="1"/>
+          </p:cNvSpPr>
+          <p:nvPr>
+            <p:ph type="sldImg"/>
+          </p:nvPr>
+        </p:nvSpPr>
+        <p:spPr/>
+      </p:sp>
+      <p:sp>
+        <p:nvSpPr>
+          <p:cNvPr id="3" name="Notes Placeholder 2"/>
+          <p:cNvSpPr>
+            <a:spLocks noGrp="1"/>
+          </p:cNvSpPr>
+          <p:nvPr>
+            <p:ph type="body" idx="1"/>
+          </p:nvPr>
+        </p:nvSpPr>
+        <p:spPr/>
+        <p:txBody>
+          <a:bodyPr/>
+          <a:lstStyle/>
+          <a:p>
+            <a:r>
+              <a:rPr lang="en-GB" dirty="0"/>
+              <a:t>Be alert to AI not always getting it right</a:t>
+            </a:r>
+          </a:p>
+          <a:p>
+            <a:r>
+              <a:rPr lang="en-GB" dirty="0"/>
+              <a:t>Determine what XAI needs your specific scenario has</a:t>
+            </a:r>
+          </a:p>
+          <a:p>
+            <a:r>
+              <a:rPr lang="en-GB" dirty="0"/>
+              <a:t>Favour transparent over opaque models if possible</a:t>
+            </a:r>
+          </a:p>
+          <a:p>
+            <a:r>
+              <a:rPr lang="en-GB" dirty="0"/>
+              <a:t>Remember that your machine learning pipeline may need to produce extra artifacts (e.g. explainers)</a:t>
+            </a:r>
+          </a:p>
+          <a:p>
+            <a:r>
+              <a:rPr lang="en-GB" dirty="0"/>
+              <a:t>When buying models in, ask the vendor how they have met the explainability challenge</a:t>
+            </a:r>
+          </a:p>
+          <a:p>
+            <a:endParaRPr lang="en-GB" dirty="0"/>
+          </a:p>
+        </p:txBody>
+      </p:sp>
+      <p:sp>
+        <p:nvSpPr>
+          <p:cNvPr id="4" name="Slide Number Placeholder 3"/>
+          <p:cNvSpPr>
+            <a:spLocks noGrp="1"/>
+          </p:cNvSpPr>
+          <p:nvPr>
+            <p:ph type="sldNum" sz="quarter" idx="5"/>
+          </p:nvPr>
+        </p:nvSpPr>
+        <p:spPr/>
+        <p:txBody>
+          <a:bodyPr/>
+          <a:lstStyle/>
+          <a:p>
+            <a:fld id="{07869F30-5F0B-4D33-8AEC-941C8824577E}" type="slidenum">
+              <a:rPr lang="en-GB" smtClean="0"/>
+              <a:t>13</a:t>
             </a:fld>
             <a:endParaRPr lang="en-GB"/>
           </a:p>
@@ -2037,99 +2217,25 @@
           <a:p>
             <a:r>
               <a:rPr lang="en-GB" dirty="0"/>
-              <a:t>The MNIST example is sufficiently basic that it may not need much in the way of XAI</a:t>
+              <a:t>Here are some instances from the test set which the model mis-classifies</a:t>
             </a:r>
           </a:p>
           <a:p>
             <a:r>
               <a:rPr lang="en-GB" dirty="0"/>
-              <a:t>But if the domain we are applying AI is novel, then they may skew us towards wanting to get a view as to how the model is working</a:t>
-            </a:r>
-          </a:p>
-          <a:p>
-            <a:endParaRPr lang="en-GB" dirty="0"/>
+              <a:t>This explainer shows us which parts of the image the model found more compelling for each classifier</a:t>
+            </a:r>
           </a:p>
           <a:p>
             <a:r>
               <a:rPr lang="en-GB" dirty="0"/>
-              <a:t>If the domain is higher risk e.g. breast cancer samples being classified as benign or malignant, recommending repair or replacement of valves in an industrial setting</a:t>
+              <a:t>But doesn’t offer any guidance as to how we can improve the classifier</a:t>
             </a:r>
           </a:p>
           <a:p>
             <a:r>
               <a:rPr lang="en-GB" dirty="0"/>
-              <a:t>If the model is wrong, we may elect to pessimistically classify a mass or the state of a component</a:t>
-            </a:r>
-          </a:p>
-          <a:p>
-            <a:pPr marL="0" marR="0" lvl="0" indent="0" algn="l" defTabSz="914400" rtl="0" eaLnBrk="1" fontAlgn="auto" latinLnBrk="0" hangingPunct="1">
-              <a:lnSpc>
-                <a:spcPct val="100000"/>
-              </a:lnSpc>
-              <a:spcBef>
-                <a:spcPts val="0"/>
-              </a:spcBef>
-              <a:spcAft>
-                <a:spcPts val="0"/>
-              </a:spcAft>
-              <a:buClrTx/>
-              <a:buSzTx/>
-              <a:buFontTx/>
-              <a:buNone/>
-              <a:tabLst/>
-              <a:defRPr/>
-            </a:pPr>
-            <a:r>
-              <a:rPr lang="en-GB" dirty="0"/>
-              <a:t>We would likely be pulled towards supplying an interpretable or explainable model for such high risk domains</a:t>
-            </a:r>
-          </a:p>
-          <a:p>
-            <a:r>
-              <a:rPr lang="en-GB" dirty="0"/>
-              <a:t>But perhaps less so for recommendation engines</a:t>
-            </a:r>
-          </a:p>
-          <a:p>
-            <a:endParaRPr lang="en-GB" dirty="0"/>
-          </a:p>
-          <a:p>
-            <a:r>
-              <a:rPr lang="en-GB" dirty="0"/>
-              <a:t>However, even for scenarios which feel low risk, we cannot necessarily ignore XAI</a:t>
-            </a:r>
-          </a:p>
-          <a:p>
-            <a:r>
-              <a:rPr lang="en-GB" dirty="0"/>
-              <a:t>For example, if a content platform’s recommendation engine is found to biased this can affect the monetisation potential of a content creator</a:t>
-            </a:r>
-          </a:p>
-          <a:p>
-            <a:r>
-              <a:rPr lang="en-GB" dirty="0"/>
-              <a:t>But it’s possible the content consumer is less concerned</a:t>
-            </a:r>
-          </a:p>
-          <a:p>
-            <a:endParaRPr lang="en-GB" dirty="0"/>
-          </a:p>
-          <a:p>
-            <a:r>
-              <a:rPr lang="en-GB" dirty="0"/>
-              <a:t>In the recent Payment Protection Insurance scandal in the UK</a:t>
-            </a:r>
-          </a:p>
-          <a:p>
-            <a:r>
-              <a:rPr lang="en-GB" dirty="0"/>
-              <a:t>Financial institutions had to provide evidence that they had not mis-sold PPI</a:t>
-            </a:r>
-          </a:p>
-          <a:p>
-            <a:r>
-              <a:rPr lang="en-GB" dirty="0"/>
-              <a:t>What if a ML model had taken part in that decision?</a:t>
+              <a:t>Could still be useful when responding the challenges</a:t>
             </a:r>
           </a:p>
         </p:txBody>
@@ -2160,7 +2266,7 @@
     </p:spTree>
     <p:extLst>
       <p:ext uri="{BB962C8B-B14F-4D97-AF65-F5344CB8AC3E}">
-        <p14:creationId xmlns:p14="http://schemas.microsoft.com/office/powerpoint/2010/main" val="1424679041"/>
+        <p14:creationId xmlns:p14="http://schemas.microsoft.com/office/powerpoint/2010/main" val="2996339148"/>
       </p:ext>
     </p:extLst>
   </p:cSld>
@@ -7815,6 +7921,93 @@
       </p:grpSpPr>
       <p:sp>
         <p:nvSpPr>
+          <p:cNvPr id="5" name="Title 4">
+            <a:extLst>
+              <a:ext uri="{FF2B5EF4-FFF2-40B4-BE49-F238E27FC236}">
+                <a16:creationId xmlns:a16="http://schemas.microsoft.com/office/drawing/2014/main" id="{34A4B2B7-6466-71AB-AC44-DFD6678A725E}"/>
+              </a:ext>
+            </a:extLst>
+          </p:cNvPr>
+          <p:cNvSpPr>
+            <a:spLocks noGrp="1"/>
+          </p:cNvSpPr>
+          <p:nvPr>
+            <p:ph type="title"/>
+          </p:nvPr>
+        </p:nvSpPr>
+        <p:spPr/>
+        <p:txBody>
+          <a:bodyPr/>
+          <a:lstStyle/>
+          <a:p>
+            <a:r>
+              <a:rPr lang="en-GB" dirty="0"/>
+              <a:t>When The Model Is Wrong</a:t>
+            </a:r>
+          </a:p>
+        </p:txBody>
+      </p:sp>
+      <p:pic>
+        <p:nvPicPr>
+          <p:cNvPr id="8" name="Content Placeholder 7">
+            <a:extLst>
+              <a:ext uri="{FF2B5EF4-FFF2-40B4-BE49-F238E27FC236}">
+                <a16:creationId xmlns:a16="http://schemas.microsoft.com/office/drawing/2014/main" id="{5401A9ED-6670-83EA-0FBE-CA946298A636}"/>
+              </a:ext>
+            </a:extLst>
+          </p:cNvPr>
+          <p:cNvPicPr>
+            <a:picLocks noGrp="1" noChangeAspect="1"/>
+          </p:cNvPicPr>
+          <p:nvPr>
+            <p:ph idx="1"/>
+          </p:nvPr>
+        </p:nvPicPr>
+        <p:blipFill>
+          <a:blip r:embed="rId3"/>
+          <a:stretch>
+            <a:fillRect/>
+          </a:stretch>
+        </p:blipFill>
+        <p:spPr>
+          <a:xfrm>
+            <a:off x="1875640" y="2193925"/>
+            <a:ext cx="8440720" cy="4024313"/>
+          </a:xfrm>
+        </p:spPr>
+      </p:pic>
+    </p:spTree>
+    <p:extLst>
+      <p:ext uri="{BB962C8B-B14F-4D97-AF65-F5344CB8AC3E}">
+        <p14:creationId xmlns:p14="http://schemas.microsoft.com/office/powerpoint/2010/main" val="3429405124"/>
+      </p:ext>
+    </p:extLst>
+  </p:cSld>
+  <p:clrMapOvr>
+    <a:masterClrMapping/>
+  </p:clrMapOvr>
+</p:sld>
+</file>
+
+<file path=ppt/slides/slide11.xml><?xml version="1.0" encoding="utf-8"?>
+<p:sld xmlns:a="http://schemas.openxmlformats.org/drawingml/2006/main" xmlns:r="http://schemas.openxmlformats.org/officeDocument/2006/relationships" xmlns:p="http://schemas.openxmlformats.org/presentationml/2006/main">
+  <p:cSld>
+    <p:spTree>
+      <p:nvGrpSpPr>
+        <p:cNvPr id="1" name=""/>
+        <p:cNvGrpSpPr/>
+        <p:nvPr/>
+      </p:nvGrpSpPr>
+      <p:grpSpPr>
+        <a:xfrm>
+          <a:off x="0" y="0"/>
+          <a:ext cx="0" cy="0"/>
+          <a:chOff x="0" y="0"/>
+          <a:chExt cx="0" cy="0"/>
+        </a:xfrm>
+      </p:grpSpPr>
+      <p:sp>
+        <p:nvSpPr>
           <p:cNvPr id="2" name="Title 1">
             <a:extLst>
               <a:ext uri="{FF2B5EF4-FFF2-40B4-BE49-F238E27FC236}">
@@ -8180,7 +8373,7 @@
 </p:sld>
 </file>
 
-<file path=ppt/slides/slide11.xml><?xml version="1.0" encoding="utf-8"?>
+<file path=ppt/slides/slide12.xml><?xml version="1.0" encoding="utf-8"?>
 <p:sld xmlns:a="http://schemas.openxmlformats.org/drawingml/2006/main" xmlns:r="http://schemas.openxmlformats.org/officeDocument/2006/relationships" xmlns:p="http://schemas.openxmlformats.org/presentationml/2006/main">
   <p:cSld>
     <p:bg>
@@ -8710,7 +8903,7 @@
 </p:sld>
 </file>
 
-<file path=ppt/slides/slide12.xml><?xml version="1.0" encoding="utf-8"?>
+<file path=ppt/slides/slide13.xml><?xml version="1.0" encoding="utf-8"?>
 <p:sld xmlns:a="http://schemas.openxmlformats.org/drawingml/2006/main" xmlns:r="http://schemas.openxmlformats.org/officeDocument/2006/relationships" xmlns:p="http://schemas.openxmlformats.org/presentationml/2006/main">
   <p:cSld>
     <p:spTree>
@@ -9106,7 +9299,7 @@
 </p:sld>
 </file>
 
-<file path=ppt/slides/slide13.xml><?xml version="1.0" encoding="utf-8"?>
+<file path=ppt/slides/slide14.xml><?xml version="1.0" encoding="utf-8"?>
 <p:sld xmlns:a="http://schemas.openxmlformats.org/drawingml/2006/main" xmlns:r="http://schemas.openxmlformats.org/officeDocument/2006/relationships" xmlns:p="http://schemas.openxmlformats.org/presentationml/2006/main">
   <p:cSld>
     <p:spTree>

</xml_diff>